<commit_message>
Finalize the presentation and install documentation
</commit_message>
<xml_diff>
--- a/doc/cuie_FS18_Simon_Waechter.pptx
+++ b/doc/cuie_FS18_Simon_Waechter.pptx
@@ -5,19 +5,20 @@
     <p:sldMasterId id="2147483713" r:id="rId1"/>
   </p:sldMasterIdLst>
   <p:notesMasterIdLst>
-    <p:notesMasterId r:id="rId9"/>
+    <p:notesMasterId r:id="rId10"/>
   </p:notesMasterIdLst>
   <p:handoutMasterIdLst>
-    <p:handoutMasterId r:id="rId10"/>
+    <p:handoutMasterId r:id="rId11"/>
   </p:handoutMasterIdLst>
   <p:sldIdLst>
     <p:sldId id="256" r:id="rId2"/>
     <p:sldId id="266" r:id="rId3"/>
     <p:sldId id="257" r:id="rId4"/>
-    <p:sldId id="265" r:id="rId5"/>
-    <p:sldId id="269" r:id="rId6"/>
-    <p:sldId id="268" r:id="rId7"/>
-    <p:sldId id="267" r:id="rId8"/>
+    <p:sldId id="270" r:id="rId5"/>
+    <p:sldId id="265" r:id="rId6"/>
+    <p:sldId id="269" r:id="rId7"/>
+    <p:sldId id="268" r:id="rId8"/>
+    <p:sldId id="267" r:id="rId9"/>
   </p:sldIdLst>
   <p:sldSz cx="10693400" cy="7561263"/>
   <p:notesSz cx="6858000" cy="9144000"/>
@@ -222,14 +223,14 @@
           <a:effectLst/>
           <a:extLst>
             <a:ext uri="{909E8E84-426E-40dd-AFC4-6F175D3DCCD1}">
-              <a14:hiddenFill xmlns="" xmlns:a14="http://schemas.microsoft.com/office/drawing/2010/main">
+              <a14:hiddenFill xmlns:a14="http://schemas.microsoft.com/office/drawing/2010/main" xmlns="">
                 <a:solidFill>
                   <a:schemeClr val="accent1"/>
                 </a:solidFill>
               </a14:hiddenFill>
             </a:ext>
             <a:ext uri="{91240B29-F687-4f45-9708-019B960494DF}">
-              <a14:hiddenLine xmlns="" xmlns:a14="http://schemas.microsoft.com/office/drawing/2010/main" w="9525">
+              <a14:hiddenLine xmlns:a14="http://schemas.microsoft.com/office/drawing/2010/main" xmlns="" w="9525">
                 <a:solidFill>
                   <a:schemeClr val="tx1"/>
                 </a:solidFill>
@@ -239,7 +240,7 @@
               </a14:hiddenLine>
             </a:ext>
             <a:ext uri="{AF507438-7753-43e0-B8FC-AC1667EBCBE1}">
-              <a14:hiddenEffects xmlns="" xmlns:a14="http://schemas.microsoft.com/office/drawing/2010/main">
+              <a14:hiddenEffects xmlns:a14="http://schemas.microsoft.com/office/drawing/2010/main" xmlns="">
                 <a:effectLst>
                   <a:outerShdw dist="35921" dir="2700000" algn="ctr" rotWithShape="0">
                     <a:schemeClr val="bg2"/>
@@ -290,14 +291,14 @@
           <a:effectLst/>
           <a:extLst>
             <a:ext uri="{909E8E84-426E-40dd-AFC4-6F175D3DCCD1}">
-              <a14:hiddenFill xmlns="" xmlns:a14="http://schemas.microsoft.com/office/drawing/2010/main">
+              <a14:hiddenFill xmlns:a14="http://schemas.microsoft.com/office/drawing/2010/main" xmlns="">
                 <a:solidFill>
                   <a:schemeClr val="accent1"/>
                 </a:solidFill>
               </a14:hiddenFill>
             </a:ext>
             <a:ext uri="{91240B29-F687-4f45-9708-019B960494DF}">
-              <a14:hiddenLine xmlns="" xmlns:a14="http://schemas.microsoft.com/office/drawing/2010/main" w="9525">
+              <a14:hiddenLine xmlns:a14="http://schemas.microsoft.com/office/drawing/2010/main" xmlns="" w="9525">
                 <a:solidFill>
                   <a:schemeClr val="tx1"/>
                 </a:solidFill>
@@ -307,7 +308,7 @@
               </a14:hiddenLine>
             </a:ext>
             <a:ext uri="{AF507438-7753-43e0-B8FC-AC1667EBCBE1}">
-              <a14:hiddenEffects xmlns="" xmlns:a14="http://schemas.microsoft.com/office/drawing/2010/main">
+              <a14:hiddenEffects xmlns:a14="http://schemas.microsoft.com/office/drawing/2010/main" xmlns="">
                 <a:effectLst>
                   <a:outerShdw dist="35921" dir="2700000" algn="ctr" rotWithShape="0">
                     <a:schemeClr val="bg2"/>
@@ -358,14 +359,14 @@
           <a:effectLst/>
           <a:extLst>
             <a:ext uri="{909E8E84-426E-40dd-AFC4-6F175D3DCCD1}">
-              <a14:hiddenFill xmlns="" xmlns:a14="http://schemas.microsoft.com/office/drawing/2010/main">
+              <a14:hiddenFill xmlns:a14="http://schemas.microsoft.com/office/drawing/2010/main" xmlns="">
                 <a:solidFill>
                   <a:schemeClr val="accent1"/>
                 </a:solidFill>
               </a14:hiddenFill>
             </a:ext>
             <a:ext uri="{91240B29-F687-4f45-9708-019B960494DF}">
-              <a14:hiddenLine xmlns="" xmlns:a14="http://schemas.microsoft.com/office/drawing/2010/main" w="9525">
+              <a14:hiddenLine xmlns:a14="http://schemas.microsoft.com/office/drawing/2010/main" xmlns="" w="9525">
                 <a:solidFill>
                   <a:schemeClr val="tx1"/>
                 </a:solidFill>
@@ -375,7 +376,7 @@
               </a14:hiddenLine>
             </a:ext>
             <a:ext uri="{AF507438-7753-43e0-B8FC-AC1667EBCBE1}">
-              <a14:hiddenEffects xmlns="" xmlns:a14="http://schemas.microsoft.com/office/drawing/2010/main">
+              <a14:hiddenEffects xmlns:a14="http://schemas.microsoft.com/office/drawing/2010/main" xmlns="">
                 <a:effectLst>
                   <a:outerShdw dist="35921" dir="2700000" algn="ctr" rotWithShape="0">
                     <a:schemeClr val="bg2"/>
@@ -426,14 +427,14 @@
           <a:effectLst/>
           <a:extLst>
             <a:ext uri="{909E8E84-426E-40dd-AFC4-6F175D3DCCD1}">
-              <a14:hiddenFill xmlns="" xmlns:a14="http://schemas.microsoft.com/office/drawing/2010/main">
+              <a14:hiddenFill xmlns:a14="http://schemas.microsoft.com/office/drawing/2010/main" xmlns="">
                 <a:solidFill>
                   <a:schemeClr val="accent1"/>
                 </a:solidFill>
               </a14:hiddenFill>
             </a:ext>
             <a:ext uri="{91240B29-F687-4f45-9708-019B960494DF}">
-              <a14:hiddenLine xmlns="" xmlns:a14="http://schemas.microsoft.com/office/drawing/2010/main" w="9525">
+              <a14:hiddenLine xmlns:a14="http://schemas.microsoft.com/office/drawing/2010/main" xmlns="" w="9525">
                 <a:solidFill>
                   <a:schemeClr val="tx1"/>
                 </a:solidFill>
@@ -443,7 +444,7 @@
               </a14:hiddenLine>
             </a:ext>
             <a:ext uri="{AF507438-7753-43e0-B8FC-AC1667EBCBE1}">
-              <a14:hiddenEffects xmlns="" xmlns:a14="http://schemas.microsoft.com/office/drawing/2010/main">
+              <a14:hiddenEffects xmlns:a14="http://schemas.microsoft.com/office/drawing/2010/main" xmlns="">
                 <a:effectLst>
                   <a:outerShdw dist="35921" dir="2700000" algn="ctr" rotWithShape="0">
                     <a:schemeClr val="bg2"/>
@@ -535,14 +536,14 @@
           <a:effectLst/>
           <a:extLst>
             <a:ext uri="{909E8E84-426E-40dd-AFC4-6F175D3DCCD1}">
-              <a14:hiddenFill xmlns="" xmlns:a14="http://schemas.microsoft.com/office/drawing/2010/main">
+              <a14:hiddenFill xmlns:a14="http://schemas.microsoft.com/office/drawing/2010/main" xmlns="">
                 <a:solidFill>
                   <a:schemeClr val="accent1"/>
                 </a:solidFill>
               </a14:hiddenFill>
             </a:ext>
             <a:ext uri="{91240B29-F687-4f45-9708-019B960494DF}">
-              <a14:hiddenLine xmlns="" xmlns:a14="http://schemas.microsoft.com/office/drawing/2010/main" w="9525">
+              <a14:hiddenLine xmlns:a14="http://schemas.microsoft.com/office/drawing/2010/main" xmlns="" w="9525">
                 <a:solidFill>
                   <a:schemeClr val="tx1"/>
                 </a:solidFill>
@@ -552,7 +553,7 @@
               </a14:hiddenLine>
             </a:ext>
             <a:ext uri="{AF507438-7753-43e0-B8FC-AC1667EBCBE1}">
-              <a14:hiddenEffects xmlns="" xmlns:a14="http://schemas.microsoft.com/office/drawing/2010/main">
+              <a14:hiddenEffects xmlns:a14="http://schemas.microsoft.com/office/drawing/2010/main" xmlns="">
                 <a:effectLst>
                   <a:outerShdw dist="35921" dir="2700000" algn="ctr" rotWithShape="0">
                     <a:schemeClr val="bg2"/>
@@ -603,14 +604,14 @@
           <a:effectLst/>
           <a:extLst>
             <a:ext uri="{909E8E84-426E-40dd-AFC4-6F175D3DCCD1}">
-              <a14:hiddenFill xmlns="" xmlns:a14="http://schemas.microsoft.com/office/drawing/2010/main">
+              <a14:hiddenFill xmlns:a14="http://schemas.microsoft.com/office/drawing/2010/main" xmlns="">
                 <a:solidFill>
                   <a:schemeClr val="accent1"/>
                 </a:solidFill>
               </a14:hiddenFill>
             </a:ext>
             <a:ext uri="{91240B29-F687-4f45-9708-019B960494DF}">
-              <a14:hiddenLine xmlns="" xmlns:a14="http://schemas.microsoft.com/office/drawing/2010/main" w="9525">
+              <a14:hiddenLine xmlns:a14="http://schemas.microsoft.com/office/drawing/2010/main" xmlns="" w="9525">
                 <a:solidFill>
                   <a:schemeClr val="tx1"/>
                 </a:solidFill>
@@ -620,7 +621,7 @@
               </a14:hiddenLine>
             </a:ext>
             <a:ext uri="{AF507438-7753-43e0-B8FC-AC1667EBCBE1}">
-              <a14:hiddenEffects xmlns="" xmlns:a14="http://schemas.microsoft.com/office/drawing/2010/main">
+              <a14:hiddenEffects xmlns:a14="http://schemas.microsoft.com/office/drawing/2010/main" xmlns="">
                 <a:effectLst>
                   <a:outerShdw dist="35921" dir="2700000" algn="ctr" rotWithShape="0">
                     <a:schemeClr val="bg2"/>
@@ -676,7 +677,7 @@
           <a:effectLst/>
           <a:extLst>
             <a:ext uri="{AF507438-7753-43e0-B8FC-AC1667EBCBE1}">
-              <a14:hiddenEffects xmlns="" xmlns:a14="http://schemas.microsoft.com/office/drawing/2010/main">
+              <a14:hiddenEffects xmlns:a14="http://schemas.microsoft.com/office/drawing/2010/main" xmlns="">
                 <a:effectLst>
                   <a:outerShdw dist="35921" dir="2700000" algn="ctr" rotWithShape="0">
                     <a:srgbClr val="808080"/>
@@ -685,7 +686,7 @@
               </a14:hiddenEffects>
             </a:ext>
             <a:ext uri="{53640926-AAD7-44d8-BBD7-CCE9431645EC}">
-              <a14:shadowObscured xmlns="" xmlns:a14="http://schemas.microsoft.com/office/drawing/2010/main" val="1"/>
+              <a14:shadowObscured xmlns:a14="http://schemas.microsoft.com/office/drawing/2010/main" xmlns="" val="1"/>
             </a:ext>
           </a:extLst>
         </p:spPr>
@@ -715,14 +716,14 @@
           <a:effectLst/>
           <a:extLst>
             <a:ext uri="{909E8E84-426E-40dd-AFC4-6F175D3DCCD1}">
-              <a14:hiddenFill xmlns="" xmlns:a14="http://schemas.microsoft.com/office/drawing/2010/main">
+              <a14:hiddenFill xmlns:a14="http://schemas.microsoft.com/office/drawing/2010/main" xmlns="">
                 <a:solidFill>
                   <a:schemeClr val="accent1"/>
                 </a:solidFill>
               </a14:hiddenFill>
             </a:ext>
             <a:ext uri="{91240B29-F687-4f45-9708-019B960494DF}">
-              <a14:hiddenLine xmlns="" xmlns:a14="http://schemas.microsoft.com/office/drawing/2010/main" w="9525">
+              <a14:hiddenLine xmlns:a14="http://schemas.microsoft.com/office/drawing/2010/main" xmlns="" w="9525">
                 <a:solidFill>
                   <a:schemeClr val="tx1"/>
                 </a:solidFill>
@@ -732,7 +733,7 @@
               </a14:hiddenLine>
             </a:ext>
             <a:ext uri="{AF507438-7753-43e0-B8FC-AC1667EBCBE1}">
-              <a14:hiddenEffects xmlns="" xmlns:a14="http://schemas.microsoft.com/office/drawing/2010/main">
+              <a14:hiddenEffects xmlns:a14="http://schemas.microsoft.com/office/drawing/2010/main" xmlns="">
                 <a:effectLst>
                   <a:outerShdw dist="35921" dir="2700000" algn="ctr" rotWithShape="0">
                     <a:schemeClr val="bg2"/>
@@ -811,14 +812,14 @@
           <a:effectLst/>
           <a:extLst>
             <a:ext uri="{909E8E84-426E-40dd-AFC4-6F175D3DCCD1}">
-              <a14:hiddenFill xmlns="" xmlns:a14="http://schemas.microsoft.com/office/drawing/2010/main">
+              <a14:hiddenFill xmlns:a14="http://schemas.microsoft.com/office/drawing/2010/main" xmlns="">
                 <a:solidFill>
                   <a:schemeClr val="accent1"/>
                 </a:solidFill>
               </a14:hiddenFill>
             </a:ext>
             <a:ext uri="{91240B29-F687-4f45-9708-019B960494DF}">
-              <a14:hiddenLine xmlns="" xmlns:a14="http://schemas.microsoft.com/office/drawing/2010/main" w="9525">
+              <a14:hiddenLine xmlns:a14="http://schemas.microsoft.com/office/drawing/2010/main" xmlns="" w="9525">
                 <a:solidFill>
                   <a:schemeClr val="tx1"/>
                 </a:solidFill>
@@ -828,7 +829,7 @@
               </a14:hiddenLine>
             </a:ext>
             <a:ext uri="{AF507438-7753-43e0-B8FC-AC1667EBCBE1}">
-              <a14:hiddenEffects xmlns="" xmlns:a14="http://schemas.microsoft.com/office/drawing/2010/main">
+              <a14:hiddenEffects xmlns:a14="http://schemas.microsoft.com/office/drawing/2010/main" xmlns="">
                 <a:effectLst>
                   <a:outerShdw dist="35921" dir="2700000" algn="ctr" rotWithShape="0">
                     <a:schemeClr val="bg2"/>
@@ -879,14 +880,14 @@
           <a:effectLst/>
           <a:extLst>
             <a:ext uri="{909E8E84-426E-40dd-AFC4-6F175D3DCCD1}">
-              <a14:hiddenFill xmlns="" xmlns:a14="http://schemas.microsoft.com/office/drawing/2010/main">
+              <a14:hiddenFill xmlns:a14="http://schemas.microsoft.com/office/drawing/2010/main" xmlns="">
                 <a:solidFill>
                   <a:schemeClr val="accent1"/>
                 </a:solidFill>
               </a14:hiddenFill>
             </a:ext>
             <a:ext uri="{91240B29-F687-4f45-9708-019B960494DF}">
-              <a14:hiddenLine xmlns="" xmlns:a14="http://schemas.microsoft.com/office/drawing/2010/main" w="9525">
+              <a14:hiddenLine xmlns:a14="http://schemas.microsoft.com/office/drawing/2010/main" xmlns="" w="9525">
                 <a:solidFill>
                   <a:schemeClr val="tx1"/>
                 </a:solidFill>
@@ -896,7 +897,7 @@
               </a14:hiddenLine>
             </a:ext>
             <a:ext uri="{AF507438-7753-43e0-B8FC-AC1667EBCBE1}">
-              <a14:hiddenEffects xmlns="" xmlns:a14="http://schemas.microsoft.com/office/drawing/2010/main">
+              <a14:hiddenEffects xmlns:a14="http://schemas.microsoft.com/office/drawing/2010/main" xmlns="">
                 <a:effectLst>
                   <a:outerShdw dist="35921" dir="2700000" algn="ctr" rotWithShape="0">
                     <a:schemeClr val="bg2"/>
@@ -1230,6 +1231,91 @@
 </p:notes>
 </file>
 
+<file path=ppt/notesSlides/notesSlide3.xml><?xml version="1.0" encoding="utf-8"?>
+<p:notes xmlns:a="http://schemas.openxmlformats.org/drawingml/2006/main" xmlns:r="http://schemas.openxmlformats.org/officeDocument/2006/relationships" xmlns:p="http://schemas.openxmlformats.org/presentationml/2006/main">
+  <p:cSld>
+    <p:spTree>
+      <p:nvGrpSpPr>
+        <p:cNvPr id="1" name=""/>
+        <p:cNvGrpSpPr/>
+        <p:nvPr/>
+      </p:nvGrpSpPr>
+      <p:grpSpPr>
+        <a:xfrm>
+          <a:off x="0" y="0"/>
+          <a:ext cx="0" cy="0"/>
+          <a:chOff x="0" y="0"/>
+          <a:chExt cx="0" cy="0"/>
+        </a:xfrm>
+      </p:grpSpPr>
+      <p:sp>
+        <p:nvSpPr>
+          <p:cNvPr id="2" name="Folienbildplatzhalter 1"/>
+          <p:cNvSpPr>
+            <a:spLocks noGrp="1" noRot="1" noChangeAspect="1"/>
+          </p:cNvSpPr>
+          <p:nvPr>
+            <p:ph type="sldImg"/>
+          </p:nvPr>
+        </p:nvSpPr>
+        <p:spPr/>
+      </p:sp>
+      <p:sp>
+        <p:nvSpPr>
+          <p:cNvPr id="3" name="Notizenplatzhalter 2"/>
+          <p:cNvSpPr>
+            <a:spLocks noGrp="1"/>
+          </p:cNvSpPr>
+          <p:nvPr>
+            <p:ph type="body" idx="1"/>
+          </p:nvPr>
+        </p:nvSpPr>
+        <p:spPr/>
+        <p:txBody>
+          <a:bodyPr/>
+          <a:lstStyle/>
+          <a:p>
+            <a:endParaRPr lang="de-CH" dirty="0"/>
+          </a:p>
+        </p:txBody>
+      </p:sp>
+      <p:sp>
+        <p:nvSpPr>
+          <p:cNvPr id="4" name="Foliennummernplatzhalter 3"/>
+          <p:cNvSpPr>
+            <a:spLocks noGrp="1"/>
+          </p:cNvSpPr>
+          <p:nvPr>
+            <p:ph type="sldNum" sz="quarter" idx="10"/>
+          </p:nvPr>
+        </p:nvSpPr>
+        <p:spPr/>
+        <p:txBody>
+          <a:bodyPr/>
+          <a:lstStyle/>
+          <a:p>
+            <a:fld id="{058061DB-DF71-4765-99A4-14E22DF63CCF}" type="slidenum">
+              <a:rPr lang="de-CH" smtClean="0"/>
+              <a:pPr/>
+              <a:t>4</a:t>
+            </a:fld>
+            <a:endParaRPr lang="de-CH"/>
+          </a:p>
+        </p:txBody>
+      </p:sp>
+    </p:spTree>
+    <p:extLst>
+      <p:ext uri="{BB962C8B-B14F-4D97-AF65-F5344CB8AC3E}">
+        <p14:creationId xmlns:p14="http://schemas.microsoft.com/office/powerpoint/2010/main" val="4289417387"/>
+      </p:ext>
+    </p:extLst>
+  </p:cSld>
+  <p:clrMapOvr>
+    <a:masterClrMapping/>
+  </p:clrMapOvr>
+</p:notes>
+</file>
+
 <file path=ppt/slideLayouts/slideLayout1.xml><?xml version="1.0" encoding="utf-8"?>
 <p:sldLayout xmlns:a="http://schemas.openxmlformats.org/drawingml/2006/main" xmlns:r="http://schemas.openxmlformats.org/officeDocument/2006/relationships" xmlns:p="http://schemas.openxmlformats.org/presentationml/2006/main" showMasterSp="0" preserve="1" userDrawn="1">
   <p:cSld name="Titelfolie">
@@ -1269,14 +1355,14 @@
           <a:ln/>
           <a:extLst>
             <a:ext uri="{909E8E84-426E-40dd-AFC4-6F175D3DCCD1}">
-              <a14:hiddenFill xmlns="" xmlns:a14="http://schemas.microsoft.com/office/drawing/2010/main">
+              <a14:hiddenFill xmlns:a14="http://schemas.microsoft.com/office/drawing/2010/main" xmlns="">
                 <a:solidFill>
                   <a:srgbClr val="FFFFFF"/>
                 </a:solidFill>
               </a14:hiddenFill>
             </a:ext>
             <a:ext uri="{91240B29-F687-4f45-9708-019B960494DF}">
-              <a14:hiddenLine xmlns="" xmlns:a14="http://schemas.microsoft.com/office/drawing/2010/main" w="9525">
+              <a14:hiddenLine xmlns:a14="http://schemas.microsoft.com/office/drawing/2010/main" xmlns="" w="9525">
                 <a:solidFill>
                   <a:srgbClr val="000000"/>
                 </a:solidFill>
@@ -1545,7 +1631,7 @@
                   <a:srgbClr val="000000"/>
                 </a:solidFill>
               </a:rPr>
-              <a:t>03.06.2018</a:t>
+              <a:t>04.06.2018</a:t>
             </a:fld>
             <a:endParaRPr lang="de-CH">
               <a:solidFill>
@@ -1742,7 +1828,7 @@
                   <a:srgbClr val="000000"/>
                 </a:solidFill>
               </a:rPr>
-              <a:t>03.06.2018</a:t>
+              <a:t>04.06.2018</a:t>
             </a:fld>
             <a:endParaRPr lang="de-CH">
               <a:solidFill>
@@ -1943,7 +2029,7 @@
                   <a:srgbClr val="000000"/>
                 </a:solidFill>
               </a:rPr>
-              <a:t>03.06.2018</a:t>
+              <a:t>04.06.2018</a:t>
             </a:fld>
             <a:endParaRPr lang="de-CH">
               <a:solidFill>
@@ -2144,7 +2230,7 @@
                   <a:srgbClr val="000000"/>
                 </a:solidFill>
               </a:rPr>
-              <a:t>03.06.2018</a:t>
+              <a:t>04.06.2018</a:t>
             </a:fld>
             <a:endParaRPr lang="de-CH">
               <a:solidFill>
@@ -2385,14 +2471,14 @@
           <a:effectLst/>
           <a:extLst>
             <a:ext uri="{909E8E84-426E-40dd-AFC4-6F175D3DCCD1}">
-              <a14:hiddenFill xmlns="" xmlns:a14="http://schemas.microsoft.com/office/drawing/2010/main">
+              <a14:hiddenFill xmlns:a14="http://schemas.microsoft.com/office/drawing/2010/main" xmlns="">
                 <a:solidFill>
                   <a:schemeClr val="accent1"/>
                 </a:solidFill>
               </a14:hiddenFill>
             </a:ext>
             <a:ext uri="{91240B29-F687-4f45-9708-019B960494DF}">
-              <a14:hiddenLine xmlns="" xmlns:a14="http://schemas.microsoft.com/office/drawing/2010/main" w="9525">
+              <a14:hiddenLine xmlns:a14="http://schemas.microsoft.com/office/drawing/2010/main" xmlns="" w="9525">
                 <a:solidFill>
                   <a:schemeClr val="tx1"/>
                 </a:solidFill>
@@ -2402,7 +2488,7 @@
               </a14:hiddenLine>
             </a:ext>
             <a:ext uri="{AF507438-7753-43e0-B8FC-AC1667EBCBE1}">
-              <a14:hiddenEffects xmlns="" xmlns:a14="http://schemas.microsoft.com/office/drawing/2010/main">
+              <a14:hiddenEffects xmlns:a14="http://schemas.microsoft.com/office/drawing/2010/main" xmlns="">
                 <a:effectLst>
                   <a:outerShdw dist="35921" dir="2700000" algn="ctr" rotWithShape="0">
                     <a:schemeClr val="bg2"/>
@@ -2453,14 +2539,14 @@
           <a:effectLst/>
           <a:extLst>
             <a:ext uri="{909E8E84-426E-40dd-AFC4-6F175D3DCCD1}">
-              <a14:hiddenFill xmlns="" xmlns:a14="http://schemas.microsoft.com/office/drawing/2010/main">
+              <a14:hiddenFill xmlns:a14="http://schemas.microsoft.com/office/drawing/2010/main" xmlns="">
                 <a:solidFill>
                   <a:schemeClr val="accent1"/>
                 </a:solidFill>
               </a14:hiddenFill>
             </a:ext>
             <a:ext uri="{91240B29-F687-4f45-9708-019B960494DF}">
-              <a14:hiddenLine xmlns="" xmlns:a14="http://schemas.microsoft.com/office/drawing/2010/main" w="9525">
+              <a14:hiddenLine xmlns:a14="http://schemas.microsoft.com/office/drawing/2010/main" xmlns="" w="9525">
                 <a:solidFill>
                   <a:schemeClr val="tx1"/>
                 </a:solidFill>
@@ -2470,7 +2556,7 @@
               </a14:hiddenLine>
             </a:ext>
             <a:ext uri="{AF507438-7753-43e0-B8FC-AC1667EBCBE1}">
-              <a14:hiddenEffects xmlns="" xmlns:a14="http://schemas.microsoft.com/office/drawing/2010/main">
+              <a14:hiddenEffects xmlns:a14="http://schemas.microsoft.com/office/drawing/2010/main" xmlns="">
                 <a:effectLst>
                   <a:outerShdw dist="35921" dir="2700000" algn="ctr" rotWithShape="0">
                     <a:schemeClr val="bg2"/>
@@ -2549,14 +2635,14 @@
           <a:effectLst/>
           <a:extLst>
             <a:ext uri="{909E8E84-426E-40dd-AFC4-6F175D3DCCD1}">
-              <a14:hiddenFill xmlns="" xmlns:a14="http://schemas.microsoft.com/office/drawing/2010/main">
+              <a14:hiddenFill xmlns:a14="http://schemas.microsoft.com/office/drawing/2010/main" xmlns="">
                 <a:solidFill>
                   <a:schemeClr val="accent1"/>
                 </a:solidFill>
               </a14:hiddenFill>
             </a:ext>
             <a:ext uri="{91240B29-F687-4f45-9708-019B960494DF}">
-              <a14:hiddenLine xmlns="" xmlns:a14="http://schemas.microsoft.com/office/drawing/2010/main" w="9525">
+              <a14:hiddenLine xmlns:a14="http://schemas.microsoft.com/office/drawing/2010/main" xmlns="" w="9525">
                 <a:solidFill>
                   <a:schemeClr val="tx1"/>
                 </a:solidFill>
@@ -2566,7 +2652,7 @@
               </a14:hiddenLine>
             </a:ext>
             <a:ext uri="{AF507438-7753-43e0-B8FC-AC1667EBCBE1}">
-              <a14:hiddenEffects xmlns="" xmlns:a14="http://schemas.microsoft.com/office/drawing/2010/main">
+              <a14:hiddenEffects xmlns:a14="http://schemas.microsoft.com/office/drawing/2010/main" xmlns="">
                 <a:effectLst>
                   <a:outerShdw dist="35921" dir="2700000" algn="ctr" rotWithShape="0">
                     <a:schemeClr val="bg2"/>
@@ -2594,7 +2680,7 @@
                   <a:srgbClr val="000000"/>
                 </a:solidFill>
               </a:rPr>
-              <a:t>03.06.2018</a:t>
+              <a:t>04.06.2018</a:t>
             </a:fld>
             <a:endParaRPr lang="de-CH">
               <a:solidFill>
@@ -2629,14 +2715,14 @@
           <a:effectLst/>
           <a:extLst>
             <a:ext uri="{909E8E84-426E-40dd-AFC4-6F175D3DCCD1}">
-              <a14:hiddenFill xmlns="" xmlns:a14="http://schemas.microsoft.com/office/drawing/2010/main">
+              <a14:hiddenFill xmlns:a14="http://schemas.microsoft.com/office/drawing/2010/main" xmlns="">
                 <a:solidFill>
                   <a:schemeClr val="accent1"/>
                 </a:solidFill>
               </a14:hiddenFill>
             </a:ext>
             <a:ext uri="{91240B29-F687-4f45-9708-019B960494DF}">
-              <a14:hiddenLine xmlns="" xmlns:a14="http://schemas.microsoft.com/office/drawing/2010/main" w="9525">
+              <a14:hiddenLine xmlns:a14="http://schemas.microsoft.com/office/drawing/2010/main" xmlns="" w="9525">
                 <a:solidFill>
                   <a:schemeClr val="tx1"/>
                 </a:solidFill>
@@ -2646,7 +2732,7 @@
               </a14:hiddenLine>
             </a:ext>
             <a:ext uri="{AF507438-7753-43e0-B8FC-AC1667EBCBE1}">
-              <a14:hiddenEffects xmlns="" xmlns:a14="http://schemas.microsoft.com/office/drawing/2010/main">
+              <a14:hiddenEffects xmlns:a14="http://schemas.microsoft.com/office/drawing/2010/main" xmlns="">
                 <a:effectLst>
                   <a:outerShdw dist="35921" dir="2700000" algn="ctr" rotWithShape="0">
                     <a:schemeClr val="bg2"/>
@@ -2704,14 +2790,14 @@
           <a:effectLst/>
           <a:extLst>
             <a:ext uri="{909E8E84-426E-40dd-AFC4-6F175D3DCCD1}">
-              <a14:hiddenFill xmlns="" xmlns:a14="http://schemas.microsoft.com/office/drawing/2010/main">
+              <a14:hiddenFill xmlns:a14="http://schemas.microsoft.com/office/drawing/2010/main" xmlns="">
                 <a:solidFill>
                   <a:schemeClr val="accent1"/>
                 </a:solidFill>
               </a14:hiddenFill>
             </a:ext>
             <a:ext uri="{91240B29-F687-4f45-9708-019B960494DF}">
-              <a14:hiddenLine xmlns="" xmlns:a14="http://schemas.microsoft.com/office/drawing/2010/main" w="9525">
+              <a14:hiddenLine xmlns:a14="http://schemas.microsoft.com/office/drawing/2010/main" xmlns="" w="9525">
                 <a:solidFill>
                   <a:schemeClr val="tx1"/>
                 </a:solidFill>
@@ -2721,7 +2807,7 @@
               </a14:hiddenLine>
             </a:ext>
             <a:ext uri="{AF507438-7753-43e0-B8FC-AC1667EBCBE1}">
-              <a14:hiddenEffects xmlns="" xmlns:a14="http://schemas.microsoft.com/office/drawing/2010/main">
+              <a14:hiddenEffects xmlns:a14="http://schemas.microsoft.com/office/drawing/2010/main" xmlns="">
                 <a:effectLst>
                   <a:outerShdw dist="35921" dir="2700000" algn="ctr" rotWithShape="0">
                     <a:schemeClr val="bg2"/>
@@ -2788,12 +2874,12 @@
           <a:effectLst/>
           <a:extLst>
             <a:ext uri="{909E8E84-426E-40dd-AFC4-6F175D3DCCD1}">
-              <a14:hiddenFill xmlns="" xmlns:a14="http://schemas.microsoft.com/office/drawing/2010/main">
+              <a14:hiddenFill xmlns:a14="http://schemas.microsoft.com/office/drawing/2010/main" xmlns="">
                 <a:noFill/>
               </a14:hiddenFill>
             </a:ext>
             <a:ext uri="{AF507438-7753-43e0-B8FC-AC1667EBCBE1}">
-              <a14:hiddenEffects xmlns="" xmlns:a14="http://schemas.microsoft.com/office/drawing/2010/main">
+              <a14:hiddenEffects xmlns:a14="http://schemas.microsoft.com/office/drawing/2010/main" xmlns="">
                 <a:effectLst>
                   <a:outerShdw dist="35921" dir="2700000" algn="ctr" rotWithShape="0">
                     <a:schemeClr val="bg2"/>
@@ -3544,7 +3630,7 @@
                   <a:srgbClr val="000000"/>
                 </a:solidFill>
               </a:rPr>
-              <a:t>03.06.2018</a:t>
+              <a:t>04.06.2018</a:t>
             </a:fld>
             <a:endParaRPr lang="de-CH">
               <a:solidFill>
@@ -3766,7 +3852,7 @@
                   <a:srgbClr val="000000"/>
                 </a:solidFill>
               </a:rPr>
-              <a:t>03.06.2018</a:t>
+              <a:t>04.06.2018</a:t>
             </a:fld>
             <a:endParaRPr lang="de-CH">
               <a:solidFill>
@@ -3873,7 +3959,303 @@
           <a:p>
             <a:r>
               <a:rPr lang="de-DE" dirty="0"/>
-              <a:t>Custom Control 1: Toolbar</a:t>
+              <a:t>Custom Control 1: Toolbar (1/2)</a:t>
+            </a:r>
+          </a:p>
+        </p:txBody>
+      </p:sp>
+      <p:sp>
+        <p:nvSpPr>
+          <p:cNvPr id="6" name="Textplatzhalter 5"/>
+          <p:cNvSpPr>
+            <a:spLocks noGrp="1"/>
+          </p:cNvSpPr>
+          <p:nvPr>
+            <p:ph type="body" idx="1"/>
+          </p:nvPr>
+        </p:nvSpPr>
+        <p:spPr/>
+        <p:txBody>
+          <a:bodyPr/>
+          <a:lstStyle/>
+          <a:p>
+            <a:endParaRPr lang="de-DE" dirty="0"/>
+          </a:p>
+          <a:p>
+            <a:endParaRPr lang="de-DE" dirty="0"/>
+          </a:p>
+          <a:p>
+            <a:endParaRPr lang="de-DE" dirty="0"/>
+          </a:p>
+        </p:txBody>
+      </p:sp>
+      <p:pic>
+        <p:nvPicPr>
+          <p:cNvPr id="8" name="Picture 7">
+            <a:extLst>
+              <a:ext uri="{FF2B5EF4-FFF2-40B4-BE49-F238E27FC236}">
+                <a16:creationId xmlns:a16="http://schemas.microsoft.com/office/drawing/2014/main" id="{F232DFDC-8755-4714-9FC4-EDEC761514A5}"/>
+              </a:ext>
+            </a:extLst>
+          </p:cNvPr>
+          <p:cNvPicPr>
+            <a:picLocks noChangeAspect="1"/>
+          </p:cNvPicPr>
+          <p:nvPr/>
+        </p:nvPicPr>
+        <p:blipFill>
+          <a:blip r:embed="rId4">
+            <a:extLst>
+              <a:ext uri="{28A0092B-C50C-407E-A947-70E740481C1C}">
+                <a14:useLocalDpi xmlns:a14="http://schemas.microsoft.com/office/drawing/2010/main" val="0"/>
+              </a:ext>
+            </a:extLst>
+          </a:blip>
+          <a:stretch>
+            <a:fillRect/>
+          </a:stretch>
+        </p:blipFill>
+        <p:spPr>
+          <a:xfrm>
+            <a:off x="195984" y="3664044"/>
+            <a:ext cx="9847994" cy="1484739"/>
+          </a:xfrm>
+          <a:prstGeom prst="rect">
+            <a:avLst/>
+          </a:prstGeom>
+        </p:spPr>
+      </p:pic>
+      <p:pic>
+        <p:nvPicPr>
+          <p:cNvPr id="11" name="Picture 10">
+            <a:extLst>
+              <a:ext uri="{FF2B5EF4-FFF2-40B4-BE49-F238E27FC236}">
+                <a16:creationId xmlns:a16="http://schemas.microsoft.com/office/drawing/2014/main" id="{5D8FA54E-939E-48F2-8A22-A898BFD396E3}"/>
+              </a:ext>
+            </a:extLst>
+          </p:cNvPr>
+          <p:cNvPicPr>
+            <a:picLocks noChangeAspect="1"/>
+          </p:cNvPicPr>
+          <p:nvPr/>
+        </p:nvPicPr>
+        <p:blipFill>
+          <a:blip r:embed="rId5">
+            <a:extLst>
+              <a:ext uri="{28A0092B-C50C-407E-A947-70E740481C1C}">
+                <a14:useLocalDpi xmlns:a14="http://schemas.microsoft.com/office/drawing/2010/main" val="0"/>
+              </a:ext>
+            </a:extLst>
+          </a:blip>
+          <a:stretch>
+            <a:fillRect/>
+          </a:stretch>
+        </p:blipFill>
+        <p:spPr>
+          <a:xfrm>
+            <a:off x="162124" y="1989923"/>
+            <a:ext cx="10153128" cy="1715528"/>
+          </a:xfrm>
+          <a:prstGeom prst="rect">
+            <a:avLst/>
+          </a:prstGeom>
+        </p:spPr>
+      </p:pic>
+      <p:pic>
+        <p:nvPicPr>
+          <p:cNvPr id="13" name="Picture 12">
+            <a:extLst>
+              <a:ext uri="{FF2B5EF4-FFF2-40B4-BE49-F238E27FC236}">
+                <a16:creationId xmlns:a16="http://schemas.microsoft.com/office/drawing/2014/main" id="{D3DD9C2F-DB9E-417A-B307-939A53B8E845}"/>
+              </a:ext>
+            </a:extLst>
+          </p:cNvPr>
+          <p:cNvPicPr>
+            <a:picLocks noChangeAspect="1"/>
+          </p:cNvPicPr>
+          <p:nvPr/>
+        </p:nvPicPr>
+        <p:blipFill>
+          <a:blip r:embed="rId6">
+            <a:extLst>
+              <a:ext uri="{28A0092B-C50C-407E-A947-70E740481C1C}">
+                <a14:useLocalDpi xmlns:a14="http://schemas.microsoft.com/office/drawing/2010/main" val="0"/>
+              </a:ext>
+            </a:extLst>
+          </a:blip>
+          <a:stretch>
+            <a:fillRect/>
+          </a:stretch>
+        </p:blipFill>
+        <p:spPr>
+          <a:xfrm>
+            <a:off x="199574" y="5282041"/>
+            <a:ext cx="9971662" cy="1623294"/>
+          </a:xfrm>
+          <a:prstGeom prst="rect">
+            <a:avLst/>
+          </a:prstGeom>
+        </p:spPr>
+      </p:pic>
+    </p:spTree>
+    <p:extLst>
+      <p:ext uri="{BB962C8B-B14F-4D97-AF65-F5344CB8AC3E}">
+        <p14:creationId xmlns:p14="http://schemas.microsoft.com/office/powerpoint/2010/main" val="3329433850"/>
+      </p:ext>
+    </p:extLst>
+  </p:cSld>
+  <p:clrMapOvr>
+    <a:masterClrMapping/>
+  </p:clrMapOvr>
+</p:sld>
+</file>
+
+<file path=ppt/slides/slide4.xml><?xml version="1.0" encoding="utf-8"?>
+<p:sld xmlns:a="http://schemas.openxmlformats.org/drawingml/2006/main" xmlns:r="http://schemas.openxmlformats.org/officeDocument/2006/relationships" xmlns:p="http://schemas.openxmlformats.org/presentationml/2006/main">
+  <p:cSld>
+    <p:spTree>
+      <p:nvGrpSpPr>
+        <p:cNvPr id="1" name=""/>
+        <p:cNvGrpSpPr/>
+        <p:nvPr/>
+      </p:nvGrpSpPr>
+      <p:grpSpPr>
+        <a:xfrm>
+          <a:off x="0" y="0"/>
+          <a:ext cx="0" cy="0"/>
+          <a:chOff x="0" y="0"/>
+          <a:chExt cx="0" cy="0"/>
+        </a:xfrm>
+      </p:grpSpPr>
+      <p:sp>
+        <p:nvSpPr>
+          <p:cNvPr id="2" name="Datumsplatzhalter 1"/>
+          <p:cNvSpPr>
+            <a:spLocks noGrp="1"/>
+          </p:cNvSpPr>
+          <p:nvPr>
+            <p:ph type="dt" sz="half" idx="10"/>
+          </p:nvPr>
+        </p:nvSpPr>
+        <p:spPr/>
+        <p:txBody>
+          <a:bodyPr/>
+          <a:lstStyle/>
+          <a:p>
+            <a:fld id="{5E48492E-72D1-4785-9351-8AE1E40FBA2D}" type="datetime1">
+              <a:rPr lang="de-CH" smtClean="0">
+                <a:solidFill>
+                  <a:srgbClr val="000000"/>
+                </a:solidFill>
+              </a:rPr>
+              <a:t>04.06.2018</a:t>
+            </a:fld>
+            <a:endParaRPr lang="de-CH">
+              <a:solidFill>
+                <a:srgbClr val="000000"/>
+              </a:solidFill>
+            </a:endParaRPr>
+          </a:p>
+        </p:txBody>
+      </p:sp>
+      <p:sp>
+        <p:nvSpPr>
+          <p:cNvPr id="3" name="Fußzeilenplatzhalter 2"/>
+          <p:cNvSpPr>
+            <a:spLocks noGrp="1"/>
+          </p:cNvSpPr>
+          <p:nvPr>
+            <p:ph type="ftr" sz="quarter" idx="11"/>
+          </p:nvPr>
+        </p:nvSpPr>
+        <p:spPr>
+          <a:xfrm>
+            <a:off x="736600" y="7197725"/>
+            <a:ext cx="7485063" cy="179388"/>
+          </a:xfrm>
+        </p:spPr>
+        <p:txBody>
+          <a:bodyPr/>
+          <a:lstStyle/>
+          <a:p>
+            <a:r>
+              <a:rPr lang="de-CH" dirty="0">
+                <a:solidFill>
+                  <a:srgbClr val="000000"/>
+                </a:solidFill>
+              </a:rPr>
+              <a:t>Simon Wächter (</a:t>
+            </a:r>
+            <a:r>
+              <a:rPr lang="de-CH" dirty="0">
+                <a:solidFill>
+                  <a:srgbClr val="000000"/>
+                </a:solidFill>
+                <a:hlinkClick r:id="rId3"/>
+              </a:rPr>
+              <a:t>https://github.com/swaechter</a:t>
+            </a:r>
+            <a:r>
+              <a:rPr lang="de-CH" dirty="0">
+                <a:solidFill>
+                  <a:srgbClr val="000000"/>
+                </a:solidFill>
+              </a:rPr>
+              <a:t>)</a:t>
+            </a:r>
+          </a:p>
+        </p:txBody>
+      </p:sp>
+      <p:sp>
+        <p:nvSpPr>
+          <p:cNvPr id="4" name="Foliennummernplatzhalter 3"/>
+          <p:cNvSpPr>
+            <a:spLocks noGrp="1"/>
+          </p:cNvSpPr>
+          <p:nvPr>
+            <p:ph type="sldNum" sz="quarter" idx="12"/>
+          </p:nvPr>
+        </p:nvSpPr>
+        <p:spPr/>
+        <p:txBody>
+          <a:bodyPr/>
+          <a:lstStyle/>
+          <a:p>
+            <a:fld id="{351188DD-6605-4EF4-9E67-B567F731CE68}" type="slidenum">
+              <a:rPr lang="de-CH" smtClean="0">
+                <a:solidFill>
+                  <a:srgbClr val="000000"/>
+                </a:solidFill>
+              </a:rPr>
+              <a:pPr/>
+              <a:t>4</a:t>
+            </a:fld>
+            <a:endParaRPr lang="de-CH">
+              <a:solidFill>
+                <a:srgbClr val="000000"/>
+              </a:solidFill>
+            </a:endParaRPr>
+          </a:p>
+        </p:txBody>
+      </p:sp>
+      <p:sp>
+        <p:nvSpPr>
+          <p:cNvPr id="5" name="Titel 4"/>
+          <p:cNvSpPr>
+            <a:spLocks noGrp="1"/>
+          </p:cNvSpPr>
+          <p:nvPr>
+            <p:ph type="title"/>
+          </p:nvPr>
+        </p:nvSpPr>
+        <p:spPr/>
+        <p:txBody>
+          <a:bodyPr/>
+          <a:lstStyle/>
+          <a:p>
+            <a:r>
+              <a:rPr lang="de-DE" dirty="0"/>
+              <a:t>Custom Control 1: Toolbar (2/2)</a:t>
             </a:r>
           </a:p>
         </p:txBody>
@@ -4013,7 +4395,7 @@
     </p:spTree>
     <p:extLst>
       <p:ext uri="{BB962C8B-B14F-4D97-AF65-F5344CB8AC3E}">
-        <p14:creationId xmlns:p14="http://schemas.microsoft.com/office/powerpoint/2010/main" val="3329433850"/>
+        <p14:creationId xmlns:p14="http://schemas.microsoft.com/office/powerpoint/2010/main" val="1384603223"/>
       </p:ext>
     </p:extLst>
   </p:cSld>
@@ -4023,7 +4405,7 @@
 </p:sld>
 </file>
 
-<file path=ppt/slides/slide4.xml><?xml version="1.0" encoding="utf-8"?>
+<file path=ppt/slides/slide5.xml><?xml version="1.0" encoding="utf-8"?>
 <p:sld xmlns:a="http://schemas.openxmlformats.org/drawingml/2006/main" xmlns:r="http://schemas.openxmlformats.org/officeDocument/2006/relationships" xmlns:p="http://schemas.openxmlformats.org/presentationml/2006/main">
   <p:cSld>
     <p:spTree>
@@ -4067,7 +4449,7 @@
                   <a:srgbClr val="000000"/>
                 </a:solidFill>
               </a:rPr>
-              <a:t>03.06.2018</a:t>
+              <a:t>04.06.2018</a:t>
             </a:fld>
             <a:endParaRPr lang="de-CH">
               <a:solidFill>
@@ -4099,12 +4481,29 @@
           <a:lstStyle/>
           <a:p>
             <a:r>
-              <a:rPr lang="de-CH">
+              <a:rPr lang="de-CH" dirty="0">
                 <a:solidFill>
                   <a:srgbClr val="000000"/>
                 </a:solidFill>
               </a:rPr>
-              <a:t>Institut</a:t>
+              <a:t>Simon Wächter (</a:t>
+            </a:r>
+            <a:r>
+              <a:rPr lang="de-CH" dirty="0">
+                <a:solidFill>
+                  <a:srgbClr val="000000"/>
+                </a:solidFill>
+                <a:hlinkClick r:id="rId2"/>
+              </a:rPr>
+              <a:t>https://github.com/swaechter</a:t>
+            </a:r>
+            <a:r>
+              <a:rPr lang="de-CH" dirty="0">
+                <a:solidFill>
+                  <a:srgbClr val="000000"/>
+                </a:solidFill>
+              </a:rPr>
+              <a:t>)</a:t>
             </a:r>
           </a:p>
         </p:txBody>
@@ -4137,7 +4536,7 @@
                 </a:solidFill>
               </a:rPr>
               <a:pPr/>
-              <a:t>4</a:t>
+              <a:t>5</a:t>
             </a:fld>
             <a:endParaRPr lang="de-CH">
               <a:solidFill>
@@ -4237,7 +4636,7 @@
           <p:nvPr/>
         </p:nvPicPr>
         <p:blipFill>
-          <a:blip r:embed="rId2">
+          <a:blip r:embed="rId3">
             <a:extLst>
               <a:ext uri="{28A0092B-C50C-407E-A947-70E740481C1C}">
                 <a14:useLocalDpi xmlns:a14="http://schemas.microsoft.com/office/drawing/2010/main" val="0"/>
@@ -4271,7 +4670,7 @@
 </p:sld>
 </file>
 
-<file path=ppt/slides/slide5.xml><?xml version="1.0" encoding="utf-8"?>
+<file path=ppt/slides/slide6.xml><?xml version="1.0" encoding="utf-8"?>
 <p:sld xmlns:a="http://schemas.openxmlformats.org/drawingml/2006/main" xmlns:r="http://schemas.openxmlformats.org/officeDocument/2006/relationships" xmlns:p="http://schemas.openxmlformats.org/presentationml/2006/main">
   <p:cSld>
     <p:spTree>
@@ -4315,7 +4714,7 @@
                   <a:srgbClr val="000000"/>
                 </a:solidFill>
               </a:rPr>
-              <a:t>03.06.2018</a:t>
+              <a:t>04.06.2018</a:t>
             </a:fld>
             <a:endParaRPr lang="de-CH">
               <a:solidFill>
@@ -4347,12 +4746,29 @@
           <a:lstStyle/>
           <a:p>
             <a:r>
-              <a:rPr lang="de-CH">
+              <a:rPr lang="de-CH" dirty="0">
                 <a:solidFill>
                   <a:srgbClr val="000000"/>
                 </a:solidFill>
               </a:rPr>
-              <a:t>Institut</a:t>
+              <a:t>Simon Wächter (</a:t>
+            </a:r>
+            <a:r>
+              <a:rPr lang="de-CH" dirty="0">
+                <a:solidFill>
+                  <a:srgbClr val="000000"/>
+                </a:solidFill>
+                <a:hlinkClick r:id="rId2"/>
+              </a:rPr>
+              <a:t>https://github.com/swaechter</a:t>
+            </a:r>
+            <a:r>
+              <a:rPr lang="de-CH" dirty="0">
+                <a:solidFill>
+                  <a:srgbClr val="000000"/>
+                </a:solidFill>
+              </a:rPr>
+              <a:t>)</a:t>
             </a:r>
           </a:p>
         </p:txBody>
@@ -4385,7 +4801,7 @@
                 </a:solidFill>
               </a:rPr>
               <a:pPr/>
-              <a:t>5</a:t>
+              <a:t>6</a:t>
             </a:fld>
             <a:endParaRPr lang="de-CH">
               <a:solidFill>
@@ -4494,7 +4910,7 @@
           <p:nvPr/>
         </p:nvPicPr>
         <p:blipFill>
-          <a:blip r:embed="rId2">
+          <a:blip r:embed="rId3">
             <a:extLst>
               <a:ext uri="{28A0092B-C50C-407E-A947-70E740481C1C}">
                 <a14:useLocalDpi xmlns:a14="http://schemas.microsoft.com/office/drawing/2010/main" val="0"/>
@@ -4528,291 +4944,6 @@
 </p:sld>
 </file>
 
-<file path=ppt/slides/slide6.xml><?xml version="1.0" encoding="utf-8"?>
-<p:sld xmlns:a="http://schemas.openxmlformats.org/drawingml/2006/main" xmlns:r="http://schemas.openxmlformats.org/officeDocument/2006/relationships" xmlns:p="http://schemas.openxmlformats.org/presentationml/2006/main">
-  <p:cSld>
-    <p:spTree>
-      <p:nvGrpSpPr>
-        <p:cNvPr id="1" name=""/>
-        <p:cNvGrpSpPr/>
-        <p:nvPr/>
-      </p:nvGrpSpPr>
-      <p:grpSpPr>
-        <a:xfrm>
-          <a:off x="0" y="0"/>
-          <a:ext cx="0" cy="0"/>
-          <a:chOff x="0" y="0"/>
-          <a:chExt cx="0" cy="0"/>
-        </a:xfrm>
-      </p:grpSpPr>
-      <p:sp>
-        <p:nvSpPr>
-          <p:cNvPr id="2" name="Date Placeholder 1">
-            <a:extLst>
-              <a:ext uri="{FF2B5EF4-FFF2-40B4-BE49-F238E27FC236}">
-                <a16:creationId xmlns:a16="http://schemas.microsoft.com/office/drawing/2014/main" id="{2982A6A2-66FB-414A-956A-4B307DC23E29}"/>
-              </a:ext>
-            </a:extLst>
-          </p:cNvPr>
-          <p:cNvSpPr>
-            <a:spLocks noGrp="1"/>
-          </p:cNvSpPr>
-          <p:nvPr>
-            <p:ph type="dt" sz="half" idx="10"/>
-          </p:nvPr>
-        </p:nvSpPr>
-        <p:spPr/>
-        <p:txBody>
-          <a:bodyPr/>
-          <a:lstStyle/>
-          <a:p>
-            <a:fld id="{5E48492E-72D1-4785-9351-8AE1E40FBA2D}" type="datetime1">
-              <a:rPr lang="de-CH" smtClean="0">
-                <a:solidFill>
-                  <a:srgbClr val="000000"/>
-                </a:solidFill>
-              </a:rPr>
-              <a:t>03.06.2018</a:t>
-            </a:fld>
-            <a:endParaRPr lang="de-CH">
-              <a:solidFill>
-                <a:srgbClr val="000000"/>
-              </a:solidFill>
-            </a:endParaRPr>
-          </a:p>
-        </p:txBody>
-      </p:sp>
-      <p:sp>
-        <p:nvSpPr>
-          <p:cNvPr id="3" name="Footer Placeholder 2">
-            <a:extLst>
-              <a:ext uri="{FF2B5EF4-FFF2-40B4-BE49-F238E27FC236}">
-                <a16:creationId xmlns:a16="http://schemas.microsoft.com/office/drawing/2014/main" id="{D56AC2F4-79F6-4E64-854B-72782235C058}"/>
-              </a:ext>
-            </a:extLst>
-          </p:cNvPr>
-          <p:cNvSpPr>
-            <a:spLocks noGrp="1"/>
-          </p:cNvSpPr>
-          <p:nvPr>
-            <p:ph type="ftr" sz="quarter" idx="11"/>
-          </p:nvPr>
-        </p:nvSpPr>
-        <p:spPr/>
-        <p:txBody>
-          <a:bodyPr/>
-          <a:lstStyle/>
-          <a:p>
-            <a:r>
-              <a:rPr lang="de-CH">
-                <a:solidFill>
-                  <a:srgbClr val="000000"/>
-                </a:solidFill>
-              </a:rPr>
-              <a:t>Institut</a:t>
-            </a:r>
-          </a:p>
-        </p:txBody>
-      </p:sp>
-      <p:sp>
-        <p:nvSpPr>
-          <p:cNvPr id="4" name="Slide Number Placeholder 3">
-            <a:extLst>
-              <a:ext uri="{FF2B5EF4-FFF2-40B4-BE49-F238E27FC236}">
-                <a16:creationId xmlns:a16="http://schemas.microsoft.com/office/drawing/2014/main" id="{559D7171-E708-41B7-BEFC-E3515B06E85C}"/>
-              </a:ext>
-            </a:extLst>
-          </p:cNvPr>
-          <p:cNvSpPr>
-            <a:spLocks noGrp="1"/>
-          </p:cNvSpPr>
-          <p:nvPr>
-            <p:ph type="sldNum" sz="quarter" idx="12"/>
-          </p:nvPr>
-        </p:nvSpPr>
-        <p:spPr/>
-        <p:txBody>
-          <a:bodyPr/>
-          <a:lstStyle/>
-          <a:p>
-            <a:fld id="{351188DD-6605-4EF4-9E67-B567F731CE68}" type="slidenum">
-              <a:rPr lang="de-CH" smtClean="0">
-                <a:solidFill>
-                  <a:srgbClr val="000000"/>
-                </a:solidFill>
-              </a:rPr>
-              <a:pPr/>
-              <a:t>6</a:t>
-            </a:fld>
-            <a:endParaRPr lang="de-CH">
-              <a:solidFill>
-                <a:srgbClr val="000000"/>
-              </a:solidFill>
-            </a:endParaRPr>
-          </a:p>
-        </p:txBody>
-      </p:sp>
-      <p:sp>
-        <p:nvSpPr>
-          <p:cNvPr id="5" name="Title 4">
-            <a:extLst>
-              <a:ext uri="{FF2B5EF4-FFF2-40B4-BE49-F238E27FC236}">
-                <a16:creationId xmlns:a16="http://schemas.microsoft.com/office/drawing/2014/main" id="{256F83AE-65BF-4694-B488-6A04CC9A6BBE}"/>
-              </a:ext>
-            </a:extLst>
-          </p:cNvPr>
-          <p:cNvSpPr>
-            <a:spLocks noGrp="1"/>
-          </p:cNvSpPr>
-          <p:nvPr>
-            <p:ph type="title"/>
-          </p:nvPr>
-        </p:nvSpPr>
-        <p:spPr>
-          <a:xfrm>
-            <a:off x="736600" y="1509713"/>
-            <a:ext cx="9213850" cy="361950"/>
-          </a:xfrm>
-        </p:spPr>
-        <p:txBody>
-          <a:bodyPr/>
-          <a:lstStyle/>
-          <a:p>
-            <a:r>
-              <a:rPr lang="de-DE" dirty="0"/>
-              <a:t>Custom Control 2: Country </a:t>
-            </a:r>
-            <a:r>
-              <a:rPr lang="de-DE" dirty="0" err="1"/>
-              <a:t>Canton</a:t>
-            </a:r>
-            <a:r>
-              <a:rPr lang="de-DE" dirty="0"/>
-              <a:t> </a:t>
-            </a:r>
-            <a:r>
-              <a:rPr lang="de-DE" dirty="0" err="1"/>
-              <a:t>Map</a:t>
-            </a:r>
-            <a:r>
-              <a:rPr lang="de-DE" dirty="0"/>
-              <a:t> (3/3)</a:t>
-            </a:r>
-            <a:endParaRPr lang="de-CH" dirty="0"/>
-          </a:p>
-        </p:txBody>
-      </p:sp>
-      <p:sp>
-        <p:nvSpPr>
-          <p:cNvPr id="6" name="Text Placeholder 5">
-            <a:extLst>
-              <a:ext uri="{FF2B5EF4-FFF2-40B4-BE49-F238E27FC236}">
-                <a16:creationId xmlns:a16="http://schemas.microsoft.com/office/drawing/2014/main" id="{525F1181-91E7-486F-A224-EA1FED7EA70F}"/>
-              </a:ext>
-            </a:extLst>
-          </p:cNvPr>
-          <p:cNvSpPr>
-            <a:spLocks noGrp="1"/>
-          </p:cNvSpPr>
-          <p:nvPr>
-            <p:ph type="body" idx="1"/>
-          </p:nvPr>
-        </p:nvSpPr>
-        <p:spPr/>
-        <p:txBody>
-          <a:bodyPr/>
-          <a:lstStyle/>
-          <a:p>
-            <a:r>
-              <a:rPr lang="de-DE" dirty="0"/>
-              <a:t>Features:</a:t>
-            </a:r>
-          </a:p>
-          <a:p>
-            <a:pPr marL="342900" indent="-342900">
-              <a:buFont typeface="Arial" panose="020B0604020202020204" pitchFamily="34" charset="0"/>
-              <a:buChar char="•"/>
-            </a:pPr>
-            <a:r>
-              <a:rPr lang="de-DE" dirty="0" err="1"/>
-              <a:t>JavaFX</a:t>
-            </a:r>
-            <a:r>
-              <a:rPr lang="de-DE" dirty="0"/>
-              <a:t> Collection mit allen 26 Kantonen</a:t>
-            </a:r>
-          </a:p>
-          <a:p>
-            <a:pPr marL="342900" indent="-342900">
-              <a:buFont typeface="Arial" panose="020B0604020202020204" pitchFamily="34" charset="0"/>
-              <a:buChar char="•"/>
-            </a:pPr>
-            <a:r>
-              <a:rPr lang="de-DE" dirty="0"/>
-              <a:t>Kantone über Properties aktivierbar/deaktivierbar</a:t>
-            </a:r>
-          </a:p>
-          <a:p>
-            <a:pPr marL="342900" indent="-342900">
-              <a:buFont typeface="Arial" panose="020B0604020202020204" pitchFamily="34" charset="0"/>
-              <a:buChar char="•"/>
-            </a:pPr>
-            <a:r>
-              <a:rPr lang="de-DE" dirty="0"/>
-              <a:t>Click-Handler auf Kantone mit Callback</a:t>
-            </a:r>
-          </a:p>
-          <a:p>
-            <a:pPr marL="342900" indent="-342900">
-              <a:buFont typeface="Arial" panose="020B0604020202020204" pitchFamily="34" charset="0"/>
-              <a:buChar char="•"/>
-            </a:pPr>
-            <a:r>
-              <a:rPr lang="de-DE" dirty="0"/>
-              <a:t>Änderbare Farben (Aktiv/Inaktive Kantone und Grenzfarben)</a:t>
-            </a:r>
-          </a:p>
-          <a:p>
-            <a:r>
-              <a:rPr lang="de-DE" dirty="0"/>
-              <a:t>Link: </a:t>
-            </a:r>
-            <a:r>
-              <a:rPr lang="de-DE" dirty="0">
-                <a:hlinkClick r:id="rId2"/>
-              </a:rPr>
-              <a:t>https://github.com/FHNW-CUIE/hydropower-cc-swaechter</a:t>
-            </a:r>
-            <a:r>
-              <a:rPr lang="de-DE" dirty="0"/>
-              <a:t> </a:t>
-            </a:r>
-            <a:r>
-              <a:rPr lang="de-DE" dirty="0">
-                <a:sym typeface="Wingdings" panose="05000000000000000000" pitchFamily="2" charset="2"/>
-              </a:rPr>
-              <a:t> INSTALL2.md</a:t>
-            </a:r>
-            <a:endParaRPr lang="de-DE" dirty="0"/>
-          </a:p>
-          <a:p>
-            <a:endParaRPr lang="de-CH" dirty="0"/>
-          </a:p>
-        </p:txBody>
-      </p:sp>
-    </p:spTree>
-    <p:extLst>
-      <p:ext uri="{BB962C8B-B14F-4D97-AF65-F5344CB8AC3E}">
-        <p14:creationId xmlns:p14="http://schemas.microsoft.com/office/powerpoint/2010/main" val="3335074552"/>
-      </p:ext>
-    </p:extLst>
-  </p:cSld>
-  <p:clrMapOvr>
-    <a:masterClrMapping/>
-  </p:clrMapOvr>
-</p:sld>
-</file>
-
 <file path=ppt/slides/slide7.xml><?xml version="1.0" encoding="utf-8"?>
 <p:sld xmlns:a="http://schemas.openxmlformats.org/drawingml/2006/main" xmlns:r="http://schemas.openxmlformats.org/officeDocument/2006/relationships" xmlns:p="http://schemas.openxmlformats.org/presentationml/2006/main">
   <p:cSld>
@@ -4857,7 +4988,7 @@
                   <a:srgbClr val="000000"/>
                 </a:solidFill>
               </a:rPr>
-              <a:t>03.06.2018</a:t>
+              <a:t>04.06.2018</a:t>
             </a:fld>
             <a:endParaRPr lang="de-CH">
               <a:solidFill>
@@ -4889,12 +5020,29 @@
           <a:lstStyle/>
           <a:p>
             <a:r>
-              <a:rPr lang="de-CH">
+              <a:rPr lang="de-CH" dirty="0">
                 <a:solidFill>
                   <a:srgbClr val="000000"/>
                 </a:solidFill>
               </a:rPr>
-              <a:t>Institut</a:t>
+              <a:t>Simon Wächter (</a:t>
+            </a:r>
+            <a:r>
+              <a:rPr lang="de-CH" dirty="0">
+                <a:solidFill>
+                  <a:srgbClr val="000000"/>
+                </a:solidFill>
+                <a:hlinkClick r:id="rId2"/>
+              </a:rPr>
+              <a:t>https://github.com/swaechter</a:t>
+            </a:r>
+            <a:r>
+              <a:rPr lang="de-CH" dirty="0">
+                <a:solidFill>
+                  <a:srgbClr val="000000"/>
+                </a:solidFill>
+              </a:rPr>
+              <a:t>)</a:t>
             </a:r>
           </a:p>
         </p:txBody>
@@ -4965,7 +5113,23 @@
           <a:p>
             <a:r>
               <a:rPr lang="de-DE" dirty="0"/>
-              <a:t>Kontaktmöglichkeiten</a:t>
+              <a:t>Custom Control 2: Country </a:t>
+            </a:r>
+            <a:r>
+              <a:rPr lang="de-DE" dirty="0" err="1"/>
+              <a:t>Canton</a:t>
+            </a:r>
+            <a:r>
+              <a:rPr lang="de-DE" dirty="0"/>
+              <a:t> </a:t>
+            </a:r>
+            <a:r>
+              <a:rPr lang="de-DE" dirty="0" err="1"/>
+              <a:t>Map</a:t>
+            </a:r>
+            <a:r>
+              <a:rPr lang="de-DE" dirty="0"/>
+              <a:t> (3/3)</a:t>
             </a:r>
             <a:endParaRPr lang="de-CH" dirty="0"/>
           </a:p>
@@ -4992,6 +5156,292 @@
           <a:bodyPr/>
           <a:lstStyle/>
           <a:p>
+            <a:r>
+              <a:rPr lang="de-DE" dirty="0"/>
+              <a:t>Features:</a:t>
+            </a:r>
+          </a:p>
+          <a:p>
+            <a:pPr marL="342900" indent="-342900">
+              <a:buFont typeface="Arial" panose="020B0604020202020204" pitchFamily="34" charset="0"/>
+              <a:buChar char="•"/>
+            </a:pPr>
+            <a:r>
+              <a:rPr lang="de-DE" dirty="0" err="1"/>
+              <a:t>JavaFX</a:t>
+            </a:r>
+            <a:r>
+              <a:rPr lang="de-DE" dirty="0"/>
+              <a:t> Collection mit allen 26 Kantonen</a:t>
+            </a:r>
+          </a:p>
+          <a:p>
+            <a:pPr marL="342900" indent="-342900">
+              <a:buFont typeface="Arial" panose="020B0604020202020204" pitchFamily="34" charset="0"/>
+              <a:buChar char="•"/>
+            </a:pPr>
+            <a:r>
+              <a:rPr lang="de-DE" dirty="0"/>
+              <a:t>Kantone über Properties aktivierbar/deaktivierbar</a:t>
+            </a:r>
+          </a:p>
+          <a:p>
+            <a:pPr marL="342900" indent="-342900">
+              <a:buFont typeface="Arial" panose="020B0604020202020204" pitchFamily="34" charset="0"/>
+              <a:buChar char="•"/>
+            </a:pPr>
+            <a:r>
+              <a:rPr lang="de-DE" dirty="0"/>
+              <a:t>Click-Handler auf Kantone mit Callback</a:t>
+            </a:r>
+          </a:p>
+          <a:p>
+            <a:pPr marL="342900" indent="-342900">
+              <a:buFont typeface="Arial" panose="020B0604020202020204" pitchFamily="34" charset="0"/>
+              <a:buChar char="•"/>
+            </a:pPr>
+            <a:r>
+              <a:rPr lang="de-DE" dirty="0"/>
+              <a:t>Änderbare Farben (Aktiv/Inaktive Kantone und Grenzfarben)</a:t>
+            </a:r>
+          </a:p>
+          <a:p>
+            <a:r>
+              <a:rPr lang="de-DE" dirty="0"/>
+              <a:t>Link: </a:t>
+            </a:r>
+            <a:r>
+              <a:rPr lang="de-DE" dirty="0">
+                <a:hlinkClick r:id="rId3"/>
+              </a:rPr>
+              <a:t>https://github.com/FHNW-CUIE/hydropower-cc-swaechter</a:t>
+            </a:r>
+            <a:r>
+              <a:rPr lang="de-DE" dirty="0"/>
+              <a:t> </a:t>
+            </a:r>
+            <a:r>
+              <a:rPr lang="de-DE" dirty="0">
+                <a:sym typeface="Wingdings" panose="05000000000000000000" pitchFamily="2" charset="2"/>
+              </a:rPr>
+              <a:t> INSTALL2.md</a:t>
+            </a:r>
+            <a:endParaRPr lang="de-DE" dirty="0"/>
+          </a:p>
+          <a:p>
+            <a:endParaRPr lang="de-CH" dirty="0"/>
+          </a:p>
+        </p:txBody>
+      </p:sp>
+    </p:spTree>
+    <p:extLst>
+      <p:ext uri="{BB962C8B-B14F-4D97-AF65-F5344CB8AC3E}">
+        <p14:creationId xmlns:p14="http://schemas.microsoft.com/office/powerpoint/2010/main" val="3335074552"/>
+      </p:ext>
+    </p:extLst>
+  </p:cSld>
+  <p:clrMapOvr>
+    <a:masterClrMapping/>
+  </p:clrMapOvr>
+</p:sld>
+</file>
+
+<file path=ppt/slides/slide8.xml><?xml version="1.0" encoding="utf-8"?>
+<p:sld xmlns:a="http://schemas.openxmlformats.org/drawingml/2006/main" xmlns:r="http://schemas.openxmlformats.org/officeDocument/2006/relationships" xmlns:p="http://schemas.openxmlformats.org/presentationml/2006/main">
+  <p:cSld>
+    <p:spTree>
+      <p:nvGrpSpPr>
+        <p:cNvPr id="1" name=""/>
+        <p:cNvGrpSpPr/>
+        <p:nvPr/>
+      </p:nvGrpSpPr>
+      <p:grpSpPr>
+        <a:xfrm>
+          <a:off x="0" y="0"/>
+          <a:ext cx="0" cy="0"/>
+          <a:chOff x="0" y="0"/>
+          <a:chExt cx="0" cy="0"/>
+        </a:xfrm>
+      </p:grpSpPr>
+      <p:sp>
+        <p:nvSpPr>
+          <p:cNvPr id="2" name="Date Placeholder 1">
+            <a:extLst>
+              <a:ext uri="{FF2B5EF4-FFF2-40B4-BE49-F238E27FC236}">
+                <a16:creationId xmlns:a16="http://schemas.microsoft.com/office/drawing/2014/main" id="{2982A6A2-66FB-414A-956A-4B307DC23E29}"/>
+              </a:ext>
+            </a:extLst>
+          </p:cNvPr>
+          <p:cNvSpPr>
+            <a:spLocks noGrp="1"/>
+          </p:cNvSpPr>
+          <p:nvPr>
+            <p:ph type="dt" sz="half" idx="10"/>
+          </p:nvPr>
+        </p:nvSpPr>
+        <p:spPr/>
+        <p:txBody>
+          <a:bodyPr/>
+          <a:lstStyle/>
+          <a:p>
+            <a:fld id="{5E48492E-72D1-4785-9351-8AE1E40FBA2D}" type="datetime1">
+              <a:rPr lang="de-CH" smtClean="0">
+                <a:solidFill>
+                  <a:srgbClr val="000000"/>
+                </a:solidFill>
+              </a:rPr>
+              <a:t>04.06.2018</a:t>
+            </a:fld>
+            <a:endParaRPr lang="de-CH">
+              <a:solidFill>
+                <a:srgbClr val="000000"/>
+              </a:solidFill>
+            </a:endParaRPr>
+          </a:p>
+        </p:txBody>
+      </p:sp>
+      <p:sp>
+        <p:nvSpPr>
+          <p:cNvPr id="3" name="Footer Placeholder 2">
+            <a:extLst>
+              <a:ext uri="{FF2B5EF4-FFF2-40B4-BE49-F238E27FC236}">
+                <a16:creationId xmlns:a16="http://schemas.microsoft.com/office/drawing/2014/main" id="{D56AC2F4-79F6-4E64-854B-72782235C058}"/>
+              </a:ext>
+            </a:extLst>
+          </p:cNvPr>
+          <p:cNvSpPr>
+            <a:spLocks noGrp="1"/>
+          </p:cNvSpPr>
+          <p:nvPr>
+            <p:ph type="ftr" sz="quarter" idx="11"/>
+          </p:nvPr>
+        </p:nvSpPr>
+        <p:spPr/>
+        <p:txBody>
+          <a:bodyPr/>
+          <a:lstStyle/>
+          <a:p>
+            <a:r>
+              <a:rPr lang="de-CH" dirty="0">
+                <a:solidFill>
+                  <a:srgbClr val="000000"/>
+                </a:solidFill>
+              </a:rPr>
+              <a:t>Simon Wächter (</a:t>
+            </a:r>
+            <a:r>
+              <a:rPr lang="de-CH" dirty="0">
+                <a:solidFill>
+                  <a:srgbClr val="000000"/>
+                </a:solidFill>
+                <a:hlinkClick r:id="rId2"/>
+              </a:rPr>
+              <a:t>https://github.com/swaechter</a:t>
+            </a:r>
+            <a:r>
+              <a:rPr lang="de-CH" dirty="0">
+                <a:solidFill>
+                  <a:srgbClr val="000000"/>
+                </a:solidFill>
+              </a:rPr>
+              <a:t>)</a:t>
+            </a:r>
+          </a:p>
+        </p:txBody>
+      </p:sp>
+      <p:sp>
+        <p:nvSpPr>
+          <p:cNvPr id="4" name="Slide Number Placeholder 3">
+            <a:extLst>
+              <a:ext uri="{FF2B5EF4-FFF2-40B4-BE49-F238E27FC236}">
+                <a16:creationId xmlns:a16="http://schemas.microsoft.com/office/drawing/2014/main" id="{559D7171-E708-41B7-BEFC-E3515B06E85C}"/>
+              </a:ext>
+            </a:extLst>
+          </p:cNvPr>
+          <p:cNvSpPr>
+            <a:spLocks noGrp="1"/>
+          </p:cNvSpPr>
+          <p:nvPr>
+            <p:ph type="sldNum" sz="quarter" idx="12"/>
+          </p:nvPr>
+        </p:nvSpPr>
+        <p:spPr/>
+        <p:txBody>
+          <a:bodyPr/>
+          <a:lstStyle/>
+          <a:p>
+            <a:fld id="{351188DD-6605-4EF4-9E67-B567F731CE68}" type="slidenum">
+              <a:rPr lang="de-CH" smtClean="0">
+                <a:solidFill>
+                  <a:srgbClr val="000000"/>
+                </a:solidFill>
+              </a:rPr>
+              <a:pPr/>
+              <a:t>8</a:t>
+            </a:fld>
+            <a:endParaRPr lang="de-CH">
+              <a:solidFill>
+                <a:srgbClr val="000000"/>
+              </a:solidFill>
+            </a:endParaRPr>
+          </a:p>
+        </p:txBody>
+      </p:sp>
+      <p:sp>
+        <p:nvSpPr>
+          <p:cNvPr id="5" name="Title 4">
+            <a:extLst>
+              <a:ext uri="{FF2B5EF4-FFF2-40B4-BE49-F238E27FC236}">
+                <a16:creationId xmlns:a16="http://schemas.microsoft.com/office/drawing/2014/main" id="{256F83AE-65BF-4694-B488-6A04CC9A6BBE}"/>
+              </a:ext>
+            </a:extLst>
+          </p:cNvPr>
+          <p:cNvSpPr>
+            <a:spLocks noGrp="1"/>
+          </p:cNvSpPr>
+          <p:nvPr>
+            <p:ph type="title"/>
+          </p:nvPr>
+        </p:nvSpPr>
+        <p:spPr>
+          <a:xfrm>
+            <a:off x="736600" y="1509713"/>
+            <a:ext cx="9213850" cy="361950"/>
+          </a:xfrm>
+        </p:spPr>
+        <p:txBody>
+          <a:bodyPr/>
+          <a:lstStyle/>
+          <a:p>
+            <a:r>
+              <a:rPr lang="de-DE" dirty="0"/>
+              <a:t>Kontaktmöglichkeiten</a:t>
+            </a:r>
+            <a:endParaRPr lang="de-CH" dirty="0"/>
+          </a:p>
+        </p:txBody>
+      </p:sp>
+      <p:sp>
+        <p:nvSpPr>
+          <p:cNvPr id="6" name="Text Placeholder 5">
+            <a:extLst>
+              <a:ext uri="{FF2B5EF4-FFF2-40B4-BE49-F238E27FC236}">
+                <a16:creationId xmlns:a16="http://schemas.microsoft.com/office/drawing/2014/main" id="{525F1181-91E7-486F-A224-EA1FED7EA70F}"/>
+              </a:ext>
+            </a:extLst>
+          </p:cNvPr>
+          <p:cNvSpPr>
+            <a:spLocks noGrp="1"/>
+          </p:cNvSpPr>
+          <p:nvPr>
+            <p:ph type="body" idx="1"/>
+          </p:nvPr>
+        </p:nvSpPr>
+        <p:spPr/>
+        <p:txBody>
+          <a:bodyPr/>
+          <a:lstStyle/>
+          <a:p>
             <a:pPr marL="457200" indent="-457200">
               <a:buFont typeface="+mj-lt"/>
               <a:buAutoNum type="arabicPeriod"/>
@@ -5002,7 +5452,7 @@
             </a:r>
             <a:r>
               <a:rPr lang="de-CH" dirty="0">
-                <a:hlinkClick r:id="rId2"/>
+                <a:hlinkClick r:id="rId3"/>
               </a:rPr>
               <a:t>https://github.com/FHNW-CUIE/hydropower-cc-swaechter</a:t>
             </a:r>
@@ -5062,11 +5512,14 @@
             </a:r>
             <a:r>
               <a:rPr lang="de-CH" dirty="0">
-                <a:hlinkClick r:id="rId3"/>
+                <a:hlinkClick r:id="rId4"/>
               </a:rPr>
               <a:t>simon.waechter@students.fhnw.ch</a:t>
             </a:r>
-            <a:endParaRPr lang="de-CH" dirty="0"/>
+            <a:r>
+              <a:rPr lang="de-CH" dirty="0"/>
+              <a:t> oder GitHub @swaechter</a:t>
+            </a:r>
           </a:p>
           <a:p>
             <a:endParaRPr lang="de-CH" dirty="0"/>
@@ -5336,7 +5789,7 @@
         <a:effectLst/>
         <a:extLst>
           <a:ext uri="{AF507438-7753-43e0-B8FC-AC1667EBCBE1}">
-            <a14:hiddenEffects xmlns="" xmlns:a14="http://schemas.microsoft.com/office/drawing/2010/main">
+            <a14:hiddenEffects xmlns:a14="http://schemas.microsoft.com/office/drawing/2010/main" xmlns="">
               <a:effectLst>
                 <a:outerShdw dist="35921" dir="2700000" algn="ctr" rotWithShape="0">
                   <a:schemeClr val="bg2"/>
@@ -5409,7 +5862,7 @@
         <a:effectLst/>
         <a:extLst>
           <a:ext uri="{AF507438-7753-43e0-B8FC-AC1667EBCBE1}">
-            <a14:hiddenEffects xmlns="" xmlns:a14="http://schemas.microsoft.com/office/drawing/2010/main">
+            <a14:hiddenEffects xmlns:a14="http://schemas.microsoft.com/office/drawing/2010/main" xmlns="">
               <a:effectLst>
                 <a:outerShdw dist="35921" dir="2700000" algn="ctr" rotWithShape="0">
                   <a:schemeClr val="bg2"/>

</xml_diff>